<commit_message>
Updated slides with correct date!
</commit_message>
<xml_diff>
--- a/ietf116/chair-slides.pptx
+++ b/ietf116/chair-slides.pptx
@@ -122,7 +122,7 @@
           <a:p>
             <a:fld id="{7D1E0127-73B8-42F5-90CA-CEBD652C9755}" type="datetimeFigureOut">
               <a:rPr lang="en-CA" smtClean="0"/>
-              <a:t>2023-03-25</a:t>
+              <a:t>2023-03-26</a:t>
             </a:fld>
             <a:endParaRPr lang="en-CA"/>
           </a:p>
@@ -613,7 +613,7 @@
           <a:p>
             <a:fld id="{1D8BD707-D9CF-40AE-B4C6-C98DA3205C09}" type="datetimeFigureOut">
               <a:rPr lang="en-US"/>
-              <a:t>3/25/2023</a:t>
+              <a:t>3/26/2023</a:t>
             </a:fld>
             <a:endParaRPr lang="en-US"/>
           </a:p>
@@ -790,7 +790,7 @@
           <a:p>
             <a:fld id="{1D8BD707-D9CF-40AE-B4C6-C98DA3205C09}" type="datetimeFigureOut">
               <a:rPr lang="en-US"/>
-              <a:t>3/25/2023</a:t>
+              <a:t>3/26/2023</a:t>
             </a:fld>
             <a:endParaRPr lang="en-US"/>
           </a:p>
@@ -1004,7 +1004,7 @@
           <a:p>
             <a:fld id="{1D8BD707-D9CF-40AE-B4C6-C98DA3205C09}" type="datetimeFigureOut">
               <a:rPr lang="en-US"/>
-              <a:t>3/25/2023</a:t>
+              <a:t>3/26/2023</a:t>
             </a:fld>
             <a:endParaRPr lang="en-US"/>
           </a:p>
@@ -1152,7 +1152,7 @@
           <a:p>
             <a:fld id="{1D8BD707-D9CF-40AE-B4C6-C98DA3205C09}" type="datetimeFigureOut">
               <a:rPr lang="en-US"/>
-              <a:t>3/25/2023</a:t>
+              <a:t>3/26/2023</a:t>
             </a:fld>
             <a:endParaRPr lang="en-US"/>
           </a:p>
@@ -1271,7 +1271,7 @@
           <a:p>
             <a:fld id="{1D8BD707-D9CF-40AE-B4C6-C98DA3205C09}" type="datetimeFigureOut">
               <a:rPr lang="en-US"/>
-              <a:t>3/25/2023</a:t>
+              <a:t>3/26/2023</a:t>
             </a:fld>
             <a:endParaRPr lang="en-US"/>
           </a:p>
@@ -1546,7 +1546,7 @@
           <a:p>
             <a:fld id="{1D8BD707-D9CF-40AE-B4C6-C98DA3205C09}" type="datetimeFigureOut">
               <a:rPr lang="en-US"/>
-              <a:t>3/25/2023</a:t>
+              <a:t>3/26/2023</a:t>
             </a:fld>
             <a:endParaRPr lang="en-US"/>
           </a:p>
@@ -2015,7 +2015,7 @@
                   <a:srgbClr val="FFFFFF"/>
                 </a:solidFill>
               </a:rPr>
-              <a:t>26</a:t>
+              <a:t>27</a:t>
             </a:r>
             <a:r>
               <a:rPr sz="2100" spc="80" dirty="0">

</xml_diff>